<commit_message>
Added git huib to ide
</commit_message>
<xml_diff>
--- a/LightingTalks/Holy Freebies Batman.pptx
+++ b/LightingTalks/Holy Freebies Batman.pptx
@@ -9895,6 +9895,22 @@
               <a:rPr lang="en-US" dirty="0"/>
               <a:t>Notepad++</a:t>
             </a:r>
+          </a:p>
+          <a:p>
+            <a:pPr marL="457200" indent="-457200">
+              <a:buClr>
+                <a:schemeClr val="tx1">
+                  <a:lumMod val="75000"/>
+                  <a:lumOff val="25000"/>
+                </a:schemeClr>
+              </a:buClr>
+              <a:buAutoNum type="arabicPeriod"/>
+            </a:pPr>
+            <a:r>
+              <a:rPr lang="en-US"/>
+              <a:t>Git Hub</a:t>
+            </a:r>
+            <a:endParaRPr lang="en-US" dirty="0"/>
           </a:p>
           <a:p>
             <a:pPr marL="457200" indent="-457200">
@@ -10898,6 +10914,24 @@
 </file>
 
 <file path=customXml/item1.xml><?xml version="1.0" encoding="utf-8"?>
+<p:properties xmlns:p="http://schemas.microsoft.com/office/2006/metadata/properties" xmlns:xsi="http://www.w3.org/2001/XMLSchema-instance" xmlns:pc="http://schemas.microsoft.com/office/infopath/2007/PartnerControls">
+  <documentManagement>
+    <Status xmlns="71af3243-3dd4-4a8d-8c0d-dd76da1f02a5">Not started</Status>
+    <MediaServiceKeyPoints xmlns="71af3243-3dd4-4a8d-8c0d-dd76da1f02a5" xsi:nil="true"/>
+  </documentManagement>
+</p:properties>
+</file>
+
+<file path=customXml/item2.xml><?xml version="1.0" encoding="utf-8"?>
+<?mso-contentType ?>
+<FormTemplates xmlns="http://schemas.microsoft.com/sharepoint/v3/contenttype/forms">
+  <Display>DocumentLibraryForm</Display>
+  <Edit>DocumentLibraryForm</Edit>
+  <New>DocumentLibraryForm</New>
+</FormTemplates>
+</file>
+
+<file path=customXml/item3.xml><?xml version="1.0" encoding="utf-8"?>
 <ct:contentTypeSchema xmlns:ct="http://schemas.microsoft.com/office/2006/metadata/contentType" xmlns:ma="http://schemas.microsoft.com/office/2006/metadata/properties/metaAttributes" ct:_="" ma:_="" ma:contentTypeName="Document" ma:contentTypeID="0x01010079F111ED35F8CC479449609E8A0923A6" ma:contentTypeVersion="12" ma:contentTypeDescription="Create a new document." ma:contentTypeScope="" ma:versionID="fa6e671f1cd7e4d96ff9652be322dd5e">
   <xsd:schema xmlns:xsd="http://www.w3.org/2001/XMLSchema" xmlns:xs="http://www.w3.org/2001/XMLSchema" xmlns:p="http://schemas.microsoft.com/office/2006/metadata/properties" xmlns:ns2="71af3243-3dd4-4a8d-8c0d-dd76da1f02a5" xmlns:ns3="16c05727-aa75-4e4a-9b5f-8a80a1165891" targetNamespace="http://schemas.microsoft.com/office/2006/metadata/properties" ma:root="true" ma:fieldsID="4e2496f70b101db0b8013f30a071bbf7" ns2:_="" ns3:_="">
     <xsd:import namespace="71af3243-3dd4-4a8d-8c0d-dd76da1f02a5"/>
@@ -11118,25 +11152,25 @@
 </ct:contentTypeSchema>
 </file>
 
-<file path=customXml/item2.xml><?xml version="1.0" encoding="utf-8"?>
-<?mso-contentType ?>
-<FormTemplates xmlns="http://schemas.microsoft.com/sharepoint/v3/contenttype/forms">
-  <Display>DocumentLibraryForm</Display>
-  <Edit>DocumentLibraryForm</Edit>
-  <New>DocumentLibraryForm</New>
-</FormTemplates>
+<file path=customXml/itemProps1.xml><?xml version="1.0" encoding="utf-8"?>
+<ds:datastoreItem xmlns:ds="http://schemas.openxmlformats.org/officeDocument/2006/customXml" ds:itemID="{38F4328E-77DF-41E8-952F-124AE19F1F7C}">
+  <ds:schemaRefs>
+    <ds:schemaRef ds:uri="http://schemas.microsoft.com/office/2006/metadata/properties"/>
+    <ds:schemaRef ds:uri="http://schemas.microsoft.com/office/infopath/2007/PartnerControls"/>
+    <ds:schemaRef ds:uri="71af3243-3dd4-4a8d-8c0d-dd76da1f02a5"/>
+  </ds:schemaRefs>
+</ds:datastoreItem>
 </file>
 
-<file path=customXml/item3.xml><?xml version="1.0" encoding="utf-8"?>
-<p:properties xmlns:p="http://schemas.microsoft.com/office/2006/metadata/properties" xmlns:xsi="http://www.w3.org/2001/XMLSchema-instance" xmlns:pc="http://schemas.microsoft.com/office/infopath/2007/PartnerControls">
-  <documentManagement>
-    <Status xmlns="71af3243-3dd4-4a8d-8c0d-dd76da1f02a5">Not started</Status>
-    <MediaServiceKeyPoints xmlns="71af3243-3dd4-4a8d-8c0d-dd76da1f02a5" xsi:nil="true"/>
-  </documentManagement>
-</p:properties>
+<file path=customXml/itemProps2.xml><?xml version="1.0" encoding="utf-8"?>
+<ds:datastoreItem xmlns:ds="http://schemas.openxmlformats.org/officeDocument/2006/customXml" ds:itemID="{6A7FA506-1E93-4CA4-B270-1F08FD18C366}">
+  <ds:schemaRefs>
+    <ds:schemaRef ds:uri="http://schemas.microsoft.com/sharepoint/v3/contenttype/forms"/>
+  </ds:schemaRefs>
+</ds:datastoreItem>
 </file>
 
-<file path=customXml/itemProps1.xml><?xml version="1.0" encoding="utf-8"?>
+<file path=customXml/itemProps3.xml><?xml version="1.0" encoding="utf-8"?>
 <ds:datastoreItem xmlns:ds="http://schemas.openxmlformats.org/officeDocument/2006/customXml" ds:itemID="{1F2FE978-FCBC-4C90-A410-B547AA706062}">
   <ds:schemaRefs>
     <ds:schemaRef ds:uri="http://schemas.microsoft.com/office/2006/metadata/contentType"/>
@@ -11153,22 +11187,4 @@
     <ds:schemaRef ds:uri="http://schemas.microsoft.com/internal/obd"/>
   </ds:schemaRefs>
 </ds:datastoreItem>
-</file>
-
-<file path=customXml/itemProps2.xml><?xml version="1.0" encoding="utf-8"?>
-<ds:datastoreItem xmlns:ds="http://schemas.openxmlformats.org/officeDocument/2006/customXml" ds:itemID="{6A7FA506-1E93-4CA4-B270-1F08FD18C366}">
-  <ds:schemaRefs>
-    <ds:schemaRef ds:uri="http://schemas.microsoft.com/sharepoint/v3/contenttype/forms"/>
-  </ds:schemaRefs>
-</ds:datastoreItem>
-</file>
-
-<file path=customXml/itemProps3.xml><?xml version="1.0" encoding="utf-8"?>
-<ds:datastoreItem xmlns:ds="http://schemas.openxmlformats.org/officeDocument/2006/customXml" ds:itemID="{38F4328E-77DF-41E8-952F-124AE19F1F7C}">
-  <ds:schemaRefs>
-    <ds:schemaRef ds:uri="http://schemas.microsoft.com/office/2006/metadata/properties"/>
-    <ds:schemaRef ds:uri="http://schemas.microsoft.com/office/infopath/2007/PartnerControls"/>
-    <ds:schemaRef ds:uri="71af3243-3dd4-4a8d-8c0d-dd76da1f02a5"/>
-  </ds:schemaRefs>
-</ds:datastoreItem>
 </file>
</xml_diff>